<commit_message>
moved HtmlAndCss presentation to markdown
</commit_message>
<xml_diff>
--- a/javascript_basics/html_and_css_basics/HtmlAndCss.pptx
+++ b/javascript_basics/html_and_css_basics/HtmlAndCss.pptx
@@ -57,16 +57,16 @@
   <p:notesSz cx="6858000" cy="9144000"/>
   <p:embeddedFontLst>
     <p:embeddedFont>
-      <p:font typeface="AA Zuehlke" charset="0"/>
+      <p:font typeface="Consolas" panose="020B0609020204030204" pitchFamily="49" charset="0"/>
       <p:regular r:id="rId45"/>
-      <p:italic r:id="rId46"/>
+      <p:bold r:id="rId46"/>
+      <p:italic r:id="rId47"/>
+      <p:boldItalic r:id="rId48"/>
     </p:embeddedFont>
     <p:embeddedFont>
-      <p:font typeface="Consolas" pitchFamily="49" charset="0"/>
-      <p:regular r:id="rId47"/>
-      <p:bold r:id="rId48"/>
-      <p:italic r:id="rId49"/>
-      <p:boldItalic r:id="rId50"/>
+      <p:font typeface="AA Zuehlke" panose="02000503060000020004" pitchFamily="2" charset="0"/>
+      <p:regular r:id="rId49"/>
+      <p:italic r:id="rId50"/>
     </p:embeddedFont>
   </p:embeddedFontLst>
   <p:custDataLst>
@@ -169,7 +169,7 @@
   </p:defaultTextStyle>
   <p:extLst>
     <p:ext uri="{EFAFB233-063F-42B5-8137-9DF3F51BA10A}">
-      <p15:sldGuideLst xmlns="" xmlns:p15="http://schemas.microsoft.com/office/powerpoint/2012/main">
+      <p15:sldGuideLst xmlns:p15="http://schemas.microsoft.com/office/powerpoint/2012/main">
         <p15:guide id="1" orient="horz" pos="1127">
           <p15:clr>
             <a:srgbClr val="A4A3A4"/>
@@ -208,7 +208,7 @@
       </p15:sldGuideLst>
     </p:ext>
     <p:ext uri="{2D200454-40CA-4A62-9FC3-DE9A4176ACB9}">
-      <p15:notesGuideLst xmlns="" xmlns:p15="http://schemas.microsoft.com/office/powerpoint/2012/main">
+      <p15:notesGuideLst xmlns:p15="http://schemas.microsoft.com/office/powerpoint/2012/main">
         <p15:guide id="1" orient="horz" pos="2880">
           <p15:clr>
             <a:srgbClr val="A4A3A4"/>
@@ -311,7 +311,7 @@
               <a:rPr lang="de-DE" smtClean="0">
                 <a:latin typeface="AA Zuehlke" pitchFamily="2" charset="0"/>
               </a:rPr>
-              <a:t>23.08.2015</a:t>
+              <a:t>23.09.2015</a:t>
             </a:fld>
             <a:endParaRPr lang="de-DE">
               <a:latin typeface="AA Zuehlke" pitchFamily="2" charset="0"/>
@@ -489,7 +489,7 @@
             <a:fld id="{A6966AE6-B72D-4967-9CA3-8469D2863705}" type="datetimeFigureOut">
               <a:rPr lang="en-US" smtClean="0"/>
               <a:pPr/>
-              <a:t>8/23/2015</a:t>
+              <a:t>9/23/2015</a:t>
             </a:fld>
             <a:endParaRPr lang="en-US" dirty="0"/>
           </a:p>
@@ -5396,7 +5396,7 @@
           <a:lstStyle/>
           <a:p>
             <a:r>
-              <a:rPr lang="en-GB" smtClean="0"/>
+              <a:rPr lang="en-GB" dirty="0" smtClean="0"/>
               <a:t>HTML &amp; CSS basics</a:t>
             </a:r>
             <a:endParaRPr lang="en-GB" dirty="0"/>
@@ -6195,7 +6195,7 @@
                     <a:p>
                       <a:pPr fontAlgn="t"/>
                       <a:r>
-                        <a:rPr lang="en-US" sz="1500">
+                        <a:rPr lang="en-US" sz="1500" dirty="0">
                           <a:effectLst/>
                         </a:rPr>
                         <a:t>text</a:t>
@@ -6251,7 +6251,7 @@
                     <a:p>
                       <a:pPr fontAlgn="t"/>
                       <a:r>
-                        <a:rPr lang="en-US" sz="1500">
+                        <a:rPr lang="en-US" sz="1500" dirty="0">
                           <a:effectLst/>
                         </a:rPr>
                         <a:t>Defines normal text input</a:t>
@@ -6309,7 +6309,7 @@
                     <a:p>
                       <a:pPr fontAlgn="t"/>
                       <a:r>
-                        <a:rPr lang="en-US" sz="1500">
+                        <a:rPr lang="en-US" sz="1500" dirty="0">
                           <a:effectLst/>
                         </a:rPr>
                         <a:t>radio</a:t>
@@ -6365,7 +6365,7 @@
                     <a:p>
                       <a:pPr fontAlgn="t"/>
                       <a:r>
-                        <a:rPr lang="en-US" sz="1500">
+                        <a:rPr lang="en-US" sz="1500" dirty="0">
                           <a:effectLst/>
                         </a:rPr>
                         <a:t>Defines radio button input (for selecting one of many choices)</a:t>
@@ -6423,7 +6423,7 @@
                     <a:p>
                       <a:pPr fontAlgn="t"/>
                       <a:r>
-                        <a:rPr lang="en-US" sz="1500">
+                        <a:rPr lang="en-US" sz="1500" dirty="0">
                           <a:effectLst/>
                         </a:rPr>
                         <a:t>submit</a:t>
@@ -13542,7 +13542,7 @@
           <p:nvPr>
             <p:extLst>
               <p:ext uri="{D42A27DB-BD31-4B8C-83A1-F6EECF244321}">
-                <p14:modId xmlns:p14="http://schemas.microsoft.com/office/powerpoint/2010/main" val="2662040660"/>
+                <p14:modId xmlns:p14="http://schemas.microsoft.com/office/powerpoint/2010/main" val="898880364"/>
               </p:ext>
             </p:extLst>
           </p:nvPr>
@@ -13734,7 +13734,7 @@
           <p:nvPr>
             <p:extLst>
               <p:ext uri="{D42A27DB-BD31-4B8C-83A1-F6EECF244321}">
-                <p14:modId xmlns:p14="http://schemas.microsoft.com/office/powerpoint/2010/main" val="1613644530"/>
+                <p14:modId xmlns:p14="http://schemas.microsoft.com/office/powerpoint/2010/main" val="851780435"/>
               </p:ext>
             </p:extLst>
           </p:nvPr>
@@ -15264,7 +15264,7 @@
           <p:nvPr>
             <p:extLst>
               <p:ext uri="{D42A27DB-BD31-4B8C-83A1-F6EECF244321}">
-                <p14:modId xmlns:p14="http://schemas.microsoft.com/office/powerpoint/2010/main" val="4133094103"/>
+                <p14:modId xmlns:p14="http://schemas.microsoft.com/office/powerpoint/2010/main" val="2855141189"/>
               </p:ext>
             </p:extLst>
           </p:nvPr>
@@ -16042,7 +16042,7 @@
           <p:nvPr>
             <p:extLst>
               <p:ext uri="{D42A27DB-BD31-4B8C-83A1-F6EECF244321}">
-                <p14:modId xmlns:p14="http://schemas.microsoft.com/office/powerpoint/2010/main" val="191337747"/>
+                <p14:modId xmlns:p14="http://schemas.microsoft.com/office/powerpoint/2010/main" val="4027080368"/>
               </p:ext>
             </p:extLst>
           </p:nvPr>
@@ -16845,11 +16845,7 @@
           <a:p>
             <a:r>
               <a:rPr lang="en-US" sz="1800" dirty="0" smtClean="0"/>
-              <a:t>Good </a:t>
-            </a:r>
-            <a:r>
-              <a:rPr lang="en-US" sz="1800" dirty="0" smtClean="0"/>
-              <a:t>code </a:t>
+              <a:t>Good code </a:t>
             </a:r>
             <a:endParaRPr lang="en-GB" sz="1800" dirty="0"/>
           </a:p>
@@ -17253,7 +17249,6 @@
               <a:rPr lang="en-GB" dirty="0"/>
               <a:t>CSS best practices</a:t>
             </a:r>
-            <a:endParaRPr lang="en-GB" dirty="0"/>
           </a:p>
         </p:txBody>
       </p:sp>
@@ -17285,33 +17280,25 @@
           <a:p>
             <a:r>
               <a:rPr lang="en-US" sz="1800" dirty="0" smtClean="0"/>
-              <a:t>Bad </a:t>
-            </a:r>
+              <a:t>Bad code</a:t>
+            </a:r>
+          </a:p>
+          <a:p>
+            <a:endParaRPr lang="en-US" sz="1800" dirty="0" smtClean="0"/>
+          </a:p>
+          <a:p>
+            <a:endParaRPr lang="en-US" sz="1800" dirty="0" smtClean="0"/>
+          </a:p>
+          <a:p>
+            <a:endParaRPr lang="en-US" sz="1800" dirty="0"/>
+          </a:p>
+          <a:p>
+            <a:endParaRPr lang="en-US" sz="1800" dirty="0" smtClean="0"/>
+          </a:p>
+          <a:p>
             <a:r>
               <a:rPr lang="en-US" sz="1800" dirty="0" smtClean="0"/>
-              <a:t>code</a:t>
-            </a:r>
-          </a:p>
-          <a:p>
-            <a:endParaRPr lang="en-US" sz="1800" dirty="0" smtClean="0"/>
-          </a:p>
-          <a:p>
-            <a:endParaRPr lang="en-US" sz="1800" dirty="0" smtClean="0"/>
-          </a:p>
-          <a:p>
-            <a:endParaRPr lang="en-US" sz="1800" dirty="0"/>
-          </a:p>
-          <a:p>
-            <a:endParaRPr lang="en-US" sz="1800" dirty="0" smtClean="0"/>
-          </a:p>
-          <a:p>
-            <a:r>
-              <a:rPr lang="en-US" sz="1800" dirty="0" smtClean="0"/>
-              <a:t>Good </a:t>
-            </a:r>
-            <a:r>
-              <a:rPr lang="en-US" sz="1800" dirty="0" smtClean="0"/>
-              <a:t>code </a:t>
+              <a:t>Good code </a:t>
             </a:r>
             <a:endParaRPr lang="en-GB" sz="1800" dirty="0"/>
           </a:p>
@@ -17400,7 +17387,7 @@
           <p:nvPr>
             <p:extLst>
               <p:ext uri="{D42A27DB-BD31-4B8C-83A1-F6EECF244321}">
-                <p14:modId xmlns:p14="http://schemas.microsoft.com/office/powerpoint/2010/main" val="3870890248"/>
+                <p14:modId xmlns:p14="http://schemas.microsoft.com/office/powerpoint/2010/main" val="2054217701"/>
               </p:ext>
             </p:extLst>
           </p:nvPr>
@@ -17688,7 +17675,7 @@
           <p:nvPr>
             <p:extLst>
               <p:ext uri="{D42A27DB-BD31-4B8C-83A1-F6EECF244321}">
-                <p14:modId xmlns:p14="http://schemas.microsoft.com/office/powerpoint/2010/main" val="3511195338"/>
+                <p14:modId xmlns:p14="http://schemas.microsoft.com/office/powerpoint/2010/main" val="1225334127"/>
               </p:ext>
             </p:extLst>
           </p:nvPr>
@@ -18277,7 +18264,6 @@
               <a:rPr lang="en-GB" dirty="0"/>
               <a:t>CSS best practices</a:t>
             </a:r>
-            <a:endParaRPr lang="en-GB" dirty="0"/>
           </a:p>
         </p:txBody>
       </p:sp>
@@ -18309,33 +18295,25 @@
           <a:p>
             <a:r>
               <a:rPr lang="en-US" sz="1800" dirty="0" smtClean="0"/>
-              <a:t>Bad </a:t>
-            </a:r>
+              <a:t>Bad code</a:t>
+            </a:r>
+          </a:p>
+          <a:p>
+            <a:endParaRPr lang="en-US" sz="1800" dirty="0" smtClean="0"/>
+          </a:p>
+          <a:p>
+            <a:endParaRPr lang="en-US" sz="1800" dirty="0" smtClean="0"/>
+          </a:p>
+          <a:p>
+            <a:endParaRPr lang="en-US" sz="1800" dirty="0"/>
+          </a:p>
+          <a:p>
+            <a:endParaRPr lang="en-US" sz="1800" dirty="0" smtClean="0"/>
+          </a:p>
+          <a:p>
             <a:r>
               <a:rPr lang="en-US" sz="1800" dirty="0" smtClean="0"/>
-              <a:t>code</a:t>
-            </a:r>
-          </a:p>
-          <a:p>
-            <a:endParaRPr lang="en-US" sz="1800" dirty="0" smtClean="0"/>
-          </a:p>
-          <a:p>
-            <a:endParaRPr lang="en-US" sz="1800" dirty="0" smtClean="0"/>
-          </a:p>
-          <a:p>
-            <a:endParaRPr lang="en-US" sz="1800" dirty="0"/>
-          </a:p>
-          <a:p>
-            <a:endParaRPr lang="en-US" sz="1800" dirty="0" smtClean="0"/>
-          </a:p>
-          <a:p>
-            <a:r>
-              <a:rPr lang="en-US" sz="1800" dirty="0" smtClean="0"/>
-              <a:t>Good </a:t>
-            </a:r>
-            <a:r>
-              <a:rPr lang="en-US" sz="1800" dirty="0" smtClean="0"/>
-              <a:t>code </a:t>
+              <a:t>Good code </a:t>
             </a:r>
             <a:endParaRPr lang="en-GB" sz="1800" dirty="0"/>
           </a:p>
@@ -18424,7 +18402,7 @@
           <p:nvPr>
             <p:extLst>
               <p:ext uri="{D42A27DB-BD31-4B8C-83A1-F6EECF244321}">
-                <p14:modId xmlns:p14="http://schemas.microsoft.com/office/powerpoint/2010/main" val="3858078149"/>
+                <p14:modId xmlns:p14="http://schemas.microsoft.com/office/powerpoint/2010/main" val="1563738229"/>
               </p:ext>
             </p:extLst>
           </p:nvPr>
@@ -18535,7 +18513,7 @@
           <p:nvPr>
             <p:extLst>
               <p:ext uri="{D42A27DB-BD31-4B8C-83A1-F6EECF244321}">
-                <p14:modId xmlns:p14="http://schemas.microsoft.com/office/powerpoint/2010/main" val="3672394636"/>
+                <p14:modId xmlns:p14="http://schemas.microsoft.com/office/powerpoint/2010/main" val="3983808024"/>
               </p:ext>
             </p:extLst>
           </p:nvPr>
@@ -19910,7 +19888,6 @@
               <a:rPr lang="en-GB" dirty="0"/>
               <a:t>CSS best practices</a:t>
             </a:r>
-            <a:endParaRPr lang="en-GB" dirty="0"/>
           </a:p>
         </p:txBody>
       </p:sp>
@@ -19946,39 +19923,31 @@
           <a:p>
             <a:r>
               <a:rPr lang="en-US" sz="1800" dirty="0" smtClean="0"/>
-              <a:t>Bad </a:t>
-            </a:r>
+              <a:t>Bad code</a:t>
+            </a:r>
+          </a:p>
+          <a:p>
+            <a:endParaRPr lang="en-US" sz="1800" dirty="0" smtClean="0"/>
+          </a:p>
+          <a:p>
+            <a:endParaRPr lang="en-US" sz="1800" dirty="0" smtClean="0"/>
+          </a:p>
+          <a:p>
+            <a:endParaRPr lang="en-US" sz="1800" dirty="0"/>
+          </a:p>
+          <a:p>
+            <a:endParaRPr lang="en-US" sz="1800" dirty="0" smtClean="0"/>
+          </a:p>
+          <a:p>
+            <a:endParaRPr lang="en-US" sz="1800" dirty="0" smtClean="0"/>
+          </a:p>
+          <a:p>
+            <a:endParaRPr lang="en-US" sz="1800" dirty="0" smtClean="0"/>
+          </a:p>
+          <a:p>
             <a:r>
               <a:rPr lang="en-US" sz="1800" dirty="0" smtClean="0"/>
-              <a:t>code</a:t>
-            </a:r>
-          </a:p>
-          <a:p>
-            <a:endParaRPr lang="en-US" sz="1800" dirty="0" smtClean="0"/>
-          </a:p>
-          <a:p>
-            <a:endParaRPr lang="en-US" sz="1800" dirty="0" smtClean="0"/>
-          </a:p>
-          <a:p>
-            <a:endParaRPr lang="en-US" sz="1800" dirty="0"/>
-          </a:p>
-          <a:p>
-            <a:endParaRPr lang="en-US" sz="1800" dirty="0" smtClean="0"/>
-          </a:p>
-          <a:p>
-            <a:endParaRPr lang="en-US" sz="1800" dirty="0" smtClean="0"/>
-          </a:p>
-          <a:p>
-            <a:endParaRPr lang="en-US" sz="1800" dirty="0" smtClean="0"/>
-          </a:p>
-          <a:p>
-            <a:r>
-              <a:rPr lang="en-US" sz="1800" dirty="0" smtClean="0"/>
-              <a:t>Good </a:t>
-            </a:r>
-            <a:r>
-              <a:rPr lang="en-US" sz="1800" dirty="0" smtClean="0"/>
-              <a:t>code </a:t>
+              <a:t>Good code </a:t>
             </a:r>
             <a:endParaRPr lang="en-GB" sz="1800" dirty="0"/>
           </a:p>
@@ -23960,7 +23929,7 @@
   </a:extraClrSchemeLst>
   <a:extLst>
     <a:ext uri="{05A4C25C-085E-4340-85A3-A5531E510DB2}">
-      <thm15:themeFamily xmlns="" xmlns:thm15="http://schemas.microsoft.com/office/thememl/2012/main" name="Zuehlke_20141008(1).potx" id="{773D416B-06C8-4CB5-9932-A6419686C282}" vid="{28D3B6A4-4EF7-4035-A286-E8F857C163F9}"/>
+      <thm15:themeFamily xmlns:thm15="http://schemas.microsoft.com/office/thememl/2012/main" name="Zuehlke_20141008(1).potx" id="{773D416B-06C8-4CB5-9932-A6419686C282}" vid="{28D3B6A4-4EF7-4035-A286-E8F857C163F9}"/>
     </a:ext>
   </a:extLst>
 </a:theme>

</xml_diff>